<commit_message>
Update slides to introduce what lipids are.
</commit_message>
<xml_diff>
--- a/images/Image_In_ppt.pptx
+++ b/images/Image_In_ppt.pptx
@@ -6,22 +6,23 @@
   </p:sldMasterIdLst>
   <p:sldIdLst>
     <p:sldId id="258" r:id="rId2"/>
-    <p:sldId id="257" r:id="rId3"/>
-    <p:sldId id="260" r:id="rId4"/>
-    <p:sldId id="261" r:id="rId5"/>
-    <p:sldId id="262" r:id="rId6"/>
-    <p:sldId id="263" r:id="rId7"/>
-    <p:sldId id="264" r:id="rId8"/>
-    <p:sldId id="265" r:id="rId9"/>
-    <p:sldId id="266" r:id="rId10"/>
-    <p:sldId id="274" r:id="rId11"/>
-    <p:sldId id="270" r:id="rId12"/>
-    <p:sldId id="267" r:id="rId13"/>
-    <p:sldId id="268" r:id="rId14"/>
-    <p:sldId id="271" r:id="rId15"/>
-    <p:sldId id="272" r:id="rId16"/>
-    <p:sldId id="273" r:id="rId17"/>
-    <p:sldId id="259" r:id="rId18"/>
+    <p:sldId id="275" r:id="rId3"/>
+    <p:sldId id="257" r:id="rId4"/>
+    <p:sldId id="260" r:id="rId5"/>
+    <p:sldId id="261" r:id="rId6"/>
+    <p:sldId id="262" r:id="rId7"/>
+    <p:sldId id="263" r:id="rId8"/>
+    <p:sldId id="264" r:id="rId9"/>
+    <p:sldId id="265" r:id="rId10"/>
+    <p:sldId id="266" r:id="rId11"/>
+    <p:sldId id="274" r:id="rId12"/>
+    <p:sldId id="270" r:id="rId13"/>
+    <p:sldId id="267" r:id="rId14"/>
+    <p:sldId id="268" r:id="rId15"/>
+    <p:sldId id="271" r:id="rId16"/>
+    <p:sldId id="272" r:id="rId17"/>
+    <p:sldId id="273" r:id="rId18"/>
+    <p:sldId id="259" r:id="rId19"/>
   </p:sldIdLst>
   <p:sldSz cx="12192000" cy="6858000"/>
   <p:notesSz cx="6858000" cy="9144000"/>
@@ -277,7 +278,7 @@
           <a:p>
             <a:fld id="{6AD9268C-4043-4F47-9E5A-AF01BC7E8A5E}" type="datetimeFigureOut">
               <a:rPr lang="en-SG" smtClean="0"/>
-              <a:t>4/8/2022</a:t>
+              <a:t>6/8/2022</a:t>
             </a:fld>
             <a:endParaRPr lang="en-SG"/>
           </a:p>
@@ -477,7 +478,7 @@
           <a:p>
             <a:fld id="{6AD9268C-4043-4F47-9E5A-AF01BC7E8A5E}" type="datetimeFigureOut">
               <a:rPr lang="en-SG" smtClean="0"/>
-              <a:t>4/8/2022</a:t>
+              <a:t>6/8/2022</a:t>
             </a:fld>
             <a:endParaRPr lang="en-SG"/>
           </a:p>
@@ -687,7 +688,7 @@
           <a:p>
             <a:fld id="{6AD9268C-4043-4F47-9E5A-AF01BC7E8A5E}" type="datetimeFigureOut">
               <a:rPr lang="en-SG" smtClean="0"/>
-              <a:t>4/8/2022</a:t>
+              <a:t>6/8/2022</a:t>
             </a:fld>
             <a:endParaRPr lang="en-SG"/>
           </a:p>
@@ -887,7 +888,7 @@
           <a:p>
             <a:fld id="{6AD9268C-4043-4F47-9E5A-AF01BC7E8A5E}" type="datetimeFigureOut">
               <a:rPr lang="en-SG" smtClean="0"/>
-              <a:t>4/8/2022</a:t>
+              <a:t>6/8/2022</a:t>
             </a:fld>
             <a:endParaRPr lang="en-SG"/>
           </a:p>
@@ -1163,7 +1164,7 @@
           <a:p>
             <a:fld id="{6AD9268C-4043-4F47-9E5A-AF01BC7E8A5E}" type="datetimeFigureOut">
               <a:rPr lang="en-SG" smtClean="0"/>
-              <a:t>4/8/2022</a:t>
+              <a:t>6/8/2022</a:t>
             </a:fld>
             <a:endParaRPr lang="en-SG"/>
           </a:p>
@@ -1431,7 +1432,7 @@
           <a:p>
             <a:fld id="{6AD9268C-4043-4F47-9E5A-AF01BC7E8A5E}" type="datetimeFigureOut">
               <a:rPr lang="en-SG" smtClean="0"/>
-              <a:t>4/8/2022</a:t>
+              <a:t>6/8/2022</a:t>
             </a:fld>
             <a:endParaRPr lang="en-SG"/>
           </a:p>
@@ -1846,7 +1847,7 @@
           <a:p>
             <a:fld id="{6AD9268C-4043-4F47-9E5A-AF01BC7E8A5E}" type="datetimeFigureOut">
               <a:rPr lang="en-SG" smtClean="0"/>
-              <a:t>4/8/2022</a:t>
+              <a:t>6/8/2022</a:t>
             </a:fld>
             <a:endParaRPr lang="en-SG"/>
           </a:p>
@@ -1988,7 +1989,7 @@
           <a:p>
             <a:fld id="{6AD9268C-4043-4F47-9E5A-AF01BC7E8A5E}" type="datetimeFigureOut">
               <a:rPr lang="en-SG" smtClean="0"/>
-              <a:t>4/8/2022</a:t>
+              <a:t>6/8/2022</a:t>
             </a:fld>
             <a:endParaRPr lang="en-SG"/>
           </a:p>
@@ -2101,7 +2102,7 @@
           <a:p>
             <a:fld id="{6AD9268C-4043-4F47-9E5A-AF01BC7E8A5E}" type="datetimeFigureOut">
               <a:rPr lang="en-SG" smtClean="0"/>
-              <a:t>4/8/2022</a:t>
+              <a:t>6/8/2022</a:t>
             </a:fld>
             <a:endParaRPr lang="en-SG"/>
           </a:p>
@@ -2414,7 +2415,7 @@
           <a:p>
             <a:fld id="{6AD9268C-4043-4F47-9E5A-AF01BC7E8A5E}" type="datetimeFigureOut">
               <a:rPr lang="en-SG" smtClean="0"/>
-              <a:t>4/8/2022</a:t>
+              <a:t>6/8/2022</a:t>
             </a:fld>
             <a:endParaRPr lang="en-SG"/>
           </a:p>
@@ -2703,7 +2704,7 @@
           <a:p>
             <a:fld id="{6AD9268C-4043-4F47-9E5A-AF01BC7E8A5E}" type="datetimeFigureOut">
               <a:rPr lang="en-SG" smtClean="0"/>
-              <a:t>4/8/2022</a:t>
+              <a:t>6/8/2022</a:t>
             </a:fld>
             <a:endParaRPr lang="en-SG"/>
           </a:p>
@@ -2946,7 +2947,7 @@
           <a:p>
             <a:fld id="{6AD9268C-4043-4F47-9E5A-AF01BC7E8A5E}" type="datetimeFigureOut">
               <a:rPr lang="en-SG" smtClean="0"/>
-              <a:t>4/8/2022</a:t>
+              <a:t>6/8/2022</a:t>
             </a:fld>
             <a:endParaRPr lang="en-SG"/>
           </a:p>
@@ -3485,6 +3486,349 @@
           <a:chExt cx="0" cy="0"/>
         </a:xfrm>
       </p:grpSpPr>
+      <p:sp>
+        <p:nvSpPr>
+          <p:cNvPr id="2" name="Title 1">
+            <a:extLst>
+              <a:ext uri="{FF2B5EF4-FFF2-40B4-BE49-F238E27FC236}">
+                <a16:creationId xmlns:a16="http://schemas.microsoft.com/office/drawing/2014/main" id="{FE839F3C-1493-4CF8-97F3-F2BED1A85040}"/>
+              </a:ext>
+            </a:extLst>
+          </p:cNvPr>
+          <p:cNvSpPr>
+            <a:spLocks noGrp="1"/>
+          </p:cNvSpPr>
+          <p:nvPr>
+            <p:ph type="title"/>
+          </p:nvPr>
+        </p:nvSpPr>
+        <p:spPr>
+          <a:xfrm>
+            <a:off x="838200" y="365125"/>
+            <a:ext cx="10515600" cy="1325563"/>
+          </a:xfrm>
+        </p:spPr>
+        <p:txBody>
+          <a:bodyPr/>
+          <a:lstStyle/>
+          <a:p>
+            <a:r>
+              <a:rPr lang="en-SG" dirty="0"/>
+              <a:t>Motivation for using </a:t>
+            </a:r>
+            <a:r>
+              <a:rPr lang="en-SG" dirty="0" err="1"/>
+              <a:t>Plotly</a:t>
+            </a:r>
+            <a:r>
+              <a:rPr lang="en-SG" dirty="0"/>
+              <a:t> and </a:t>
+            </a:r>
+            <a:r>
+              <a:rPr lang="en-SG" dirty="0" err="1"/>
+              <a:t>Trelliscopejs</a:t>
+            </a:r>
+            <a:r>
+              <a:rPr lang="en-SG" dirty="0"/>
+              <a:t> </a:t>
+            </a:r>
+          </a:p>
+        </p:txBody>
+      </p:sp>
+      <p:grpSp>
+        <p:nvGrpSpPr>
+          <p:cNvPr id="8" name="Group 7">
+            <a:extLst>
+              <a:ext uri="{FF2B5EF4-FFF2-40B4-BE49-F238E27FC236}">
+                <a16:creationId xmlns:a16="http://schemas.microsoft.com/office/drawing/2014/main" id="{8C04475F-A62A-4B8B-996C-BCBC9A8783DE}"/>
+              </a:ext>
+            </a:extLst>
+          </p:cNvPr>
+          <p:cNvGrpSpPr/>
+          <p:nvPr/>
+        </p:nvGrpSpPr>
+        <p:grpSpPr>
+          <a:xfrm>
+            <a:off x="6096000" y="1562378"/>
+            <a:ext cx="4771619" cy="4735268"/>
+            <a:chOff x="6096000" y="1562378"/>
+            <a:chExt cx="4771619" cy="4735268"/>
+          </a:xfrm>
+        </p:grpSpPr>
+        <p:pic>
+          <p:nvPicPr>
+            <p:cNvPr id="6" name="Picture 5">
+              <a:extLst>
+                <a:ext uri="{FF2B5EF4-FFF2-40B4-BE49-F238E27FC236}">
+                  <a16:creationId xmlns:a16="http://schemas.microsoft.com/office/drawing/2014/main" id="{C3A5A9DA-9F89-4395-8AC1-AA0889484D5E}"/>
+                </a:ext>
+              </a:extLst>
+            </p:cNvPr>
+            <p:cNvPicPr>
+              <a:picLocks noChangeAspect="1"/>
+            </p:cNvPicPr>
+            <p:nvPr/>
+          </p:nvPicPr>
+          <p:blipFill>
+            <a:blip r:embed="rId2"/>
+            <a:stretch>
+              <a:fillRect/>
+            </a:stretch>
+          </p:blipFill>
+          <p:spPr>
+            <a:xfrm>
+              <a:off x="6096000" y="3805032"/>
+              <a:ext cx="4771619" cy="1071659"/>
+            </a:xfrm>
+            <a:prstGeom prst="rect">
+              <a:avLst/>
+            </a:prstGeom>
+          </p:spPr>
+        </p:pic>
+        <p:pic>
+          <p:nvPicPr>
+            <p:cNvPr id="7" name="Picture 6">
+              <a:extLst>
+                <a:ext uri="{FF2B5EF4-FFF2-40B4-BE49-F238E27FC236}">
+                  <a16:creationId xmlns:a16="http://schemas.microsoft.com/office/drawing/2014/main" id="{1E7BA09E-3CAD-4812-865C-6CAC515BF3CE}"/>
+                </a:ext>
+              </a:extLst>
+            </p:cNvPr>
+            <p:cNvPicPr>
+              <a:picLocks noChangeAspect="1"/>
+            </p:cNvPicPr>
+            <p:nvPr/>
+          </p:nvPicPr>
+          <p:blipFill rotWithShape="1">
+            <a:blip r:embed="rId3"/>
+            <a:srcRect t="13773"/>
+            <a:stretch/>
+          </p:blipFill>
+          <p:spPr>
+            <a:xfrm>
+              <a:off x="6139296" y="6114177"/>
+              <a:ext cx="4728323" cy="183469"/>
+            </a:xfrm>
+            <a:prstGeom prst="rect">
+              <a:avLst/>
+            </a:prstGeom>
+          </p:spPr>
+        </p:pic>
+        <p:pic>
+          <p:nvPicPr>
+            <p:cNvPr id="1026" name="Picture 2" descr="https://hafen.github.io/trelliscopejs/reference/figures/logo.png">
+              <a:extLst>
+                <a:ext uri="{FF2B5EF4-FFF2-40B4-BE49-F238E27FC236}">
+                  <a16:creationId xmlns:a16="http://schemas.microsoft.com/office/drawing/2014/main" id="{FAB45369-F847-4D88-8638-67597D69B804}"/>
+                </a:ext>
+              </a:extLst>
+            </p:cNvPr>
+            <p:cNvPicPr>
+              <a:picLocks noChangeAspect="1" noChangeArrowheads="1"/>
+            </p:cNvPicPr>
+            <p:nvPr/>
+          </p:nvPicPr>
+          <p:blipFill>
+            <a:blip r:embed="rId4">
+              <a:extLst>
+                <a:ext uri="{28A0092B-C50C-407E-A947-70E740481C1C}">
+                  <a14:useLocalDpi xmlns:a14="http://schemas.microsoft.com/office/drawing/2010/main" val="0"/>
+                </a:ext>
+              </a:extLst>
+            </a:blip>
+            <a:srcRect/>
+            <a:stretch>
+              <a:fillRect/>
+            </a:stretch>
+          </p:blipFill>
+          <p:spPr bwMode="auto">
+            <a:xfrm>
+              <a:off x="9275906" y="1562378"/>
+              <a:ext cx="889687" cy="1034095"/>
+            </a:xfrm>
+            <a:prstGeom prst="rect">
+              <a:avLst/>
+            </a:prstGeom>
+            <a:noFill/>
+            <a:extLst>
+              <a:ext uri="{909E8E84-426E-40DD-AFC4-6F175D3DCCD1}">
+                <a14:hiddenFill xmlns:a14="http://schemas.microsoft.com/office/drawing/2010/main">
+                  <a:solidFill>
+                    <a:srgbClr val="FFFFFF"/>
+                  </a:solidFill>
+                </a14:hiddenFill>
+              </a:ext>
+            </a:extLst>
+          </p:spPr>
+        </p:pic>
+        <p:pic>
+          <p:nvPicPr>
+            <p:cNvPr id="1028" name="Picture 4" descr="File:Plotly logo for digital final (6).png">
+              <a:extLst>
+                <a:ext uri="{FF2B5EF4-FFF2-40B4-BE49-F238E27FC236}">
+                  <a16:creationId xmlns:a16="http://schemas.microsoft.com/office/drawing/2014/main" id="{DB95B450-861C-480E-B6CB-3F3DF3E7A71A}"/>
+                </a:ext>
+              </a:extLst>
+            </p:cNvPr>
+            <p:cNvPicPr>
+              <a:picLocks noChangeAspect="1" noChangeArrowheads="1"/>
+            </p:cNvPicPr>
+            <p:nvPr/>
+          </p:nvPicPr>
+          <p:blipFill rotWithShape="1">
+            <a:blip r:embed="rId5">
+              <a:extLst>
+                <a:ext uri="{28A0092B-C50C-407E-A947-70E740481C1C}">
+                  <a14:useLocalDpi xmlns:a14="http://schemas.microsoft.com/office/drawing/2010/main" val="0"/>
+                </a:ext>
+              </a:extLst>
+            </a:blip>
+            <a:srcRect l="5532" t="28940" r="5911" b="27095"/>
+            <a:stretch/>
+          </p:blipFill>
+          <p:spPr bwMode="auto">
+            <a:xfrm>
+              <a:off x="6390474" y="1562378"/>
+              <a:ext cx="2586914" cy="963233"/>
+            </a:xfrm>
+            <a:prstGeom prst="rect">
+              <a:avLst/>
+            </a:prstGeom>
+            <a:noFill/>
+            <a:extLst>
+              <a:ext uri="{909E8E84-426E-40DD-AFC4-6F175D3DCCD1}">
+                <a14:hiddenFill xmlns:a14="http://schemas.microsoft.com/office/drawing/2010/main">
+                  <a:solidFill>
+                    <a:srgbClr val="FFFFFF"/>
+                  </a:solidFill>
+                </a14:hiddenFill>
+              </a:ext>
+            </a:extLst>
+          </p:spPr>
+        </p:pic>
+        <p:sp>
+          <p:nvSpPr>
+            <p:cNvPr id="10" name="Arrow: Right 9">
+              <a:extLst>
+                <a:ext uri="{FF2B5EF4-FFF2-40B4-BE49-F238E27FC236}">
+                  <a16:creationId xmlns:a16="http://schemas.microsoft.com/office/drawing/2014/main" id="{3338BCA3-70EE-44CD-B10A-543B7D39CA40}"/>
+                </a:ext>
+              </a:extLst>
+            </p:cNvPr>
+            <p:cNvSpPr/>
+            <p:nvPr/>
+          </p:nvSpPr>
+          <p:spPr>
+            <a:xfrm rot="5400000">
+              <a:off x="8013050" y="5382155"/>
+              <a:ext cx="1015481" cy="194220"/>
+            </a:xfrm>
+            <a:prstGeom prst="rightArrow">
+              <a:avLst/>
+            </a:prstGeom>
+          </p:spPr>
+          <p:style>
+            <a:lnRef idx="2">
+              <a:schemeClr val="dk1">
+                <a:shade val="50000"/>
+              </a:schemeClr>
+            </a:lnRef>
+            <a:fillRef idx="1">
+              <a:schemeClr val="dk1"/>
+            </a:fillRef>
+            <a:effectRef idx="0">
+              <a:schemeClr val="dk1"/>
+            </a:effectRef>
+            <a:fontRef idx="minor">
+              <a:schemeClr val="lt1"/>
+            </a:fontRef>
+          </p:style>
+          <p:txBody>
+            <a:bodyPr rtlCol="0" anchor="ctr"/>
+            <a:lstStyle/>
+            <a:p>
+              <a:pPr algn="ctr"/>
+              <a:endParaRPr lang="en-SG"/>
+            </a:p>
+          </p:txBody>
+        </p:sp>
+        <p:sp>
+          <p:nvSpPr>
+            <p:cNvPr id="14" name="Arrow: Right 13">
+              <a:extLst>
+                <a:ext uri="{FF2B5EF4-FFF2-40B4-BE49-F238E27FC236}">
+                  <a16:creationId xmlns:a16="http://schemas.microsoft.com/office/drawing/2014/main" id="{34953C13-8F7D-4DD6-9741-0C188D22A33E}"/>
+                </a:ext>
+              </a:extLst>
+            </p:cNvPr>
+            <p:cNvSpPr/>
+            <p:nvPr/>
+          </p:nvSpPr>
+          <p:spPr>
+            <a:xfrm rot="5400000">
+              <a:off x="8003525" y="3044674"/>
+              <a:ext cx="1015481" cy="194220"/>
+            </a:xfrm>
+            <a:prstGeom prst="rightArrow">
+              <a:avLst/>
+            </a:prstGeom>
+          </p:spPr>
+          <p:style>
+            <a:lnRef idx="2">
+              <a:schemeClr val="dk1">
+                <a:shade val="50000"/>
+              </a:schemeClr>
+            </a:lnRef>
+            <a:fillRef idx="1">
+              <a:schemeClr val="dk1"/>
+            </a:fillRef>
+            <a:effectRef idx="0">
+              <a:schemeClr val="dk1"/>
+            </a:effectRef>
+            <a:fontRef idx="minor">
+              <a:schemeClr val="lt1"/>
+            </a:fontRef>
+          </p:style>
+          <p:txBody>
+            <a:bodyPr rtlCol="0" anchor="ctr"/>
+            <a:lstStyle/>
+            <a:p>
+              <a:pPr algn="ctr"/>
+              <a:endParaRPr lang="en-SG"/>
+            </a:p>
+          </p:txBody>
+        </p:sp>
+      </p:grpSp>
+    </p:spTree>
+    <p:extLst>
+      <p:ext uri="{BB962C8B-B14F-4D97-AF65-F5344CB8AC3E}">
+        <p14:creationId xmlns:p14="http://schemas.microsoft.com/office/powerpoint/2010/main" val="1553705019"/>
+      </p:ext>
+    </p:extLst>
+  </p:cSld>
+  <p:clrMapOvr>
+    <a:masterClrMapping/>
+  </p:clrMapOvr>
+</p:sld>
+</file>
+
+<file path=ppt/slides/slide11.xml><?xml version="1.0" encoding="utf-8"?>
+<p:sld xmlns:a="http://schemas.openxmlformats.org/drawingml/2006/main" xmlns:r="http://schemas.openxmlformats.org/officeDocument/2006/relationships" xmlns:p="http://schemas.openxmlformats.org/presentationml/2006/main">
+  <p:cSld>
+    <p:spTree>
+      <p:nvGrpSpPr>
+        <p:cNvPr id="1" name=""/>
+        <p:cNvGrpSpPr/>
+        <p:nvPr/>
+      </p:nvGrpSpPr>
+      <p:grpSpPr>
+        <a:xfrm>
+          <a:off x="0" y="0"/>
+          <a:ext cx="0" cy="0"/>
+          <a:chOff x="0" y="0"/>
+          <a:chExt cx="0" cy="0"/>
+        </a:xfrm>
+      </p:grpSpPr>
       <p:grpSp>
         <p:nvGrpSpPr>
           <p:cNvPr id="9" name="Group 8">
@@ -3639,7 +3983,7 @@
 </p:sld>
 </file>
 
-<file path=ppt/slides/slide11.xml><?xml version="1.0" encoding="utf-8"?>
+<file path=ppt/slides/slide12.xml><?xml version="1.0" encoding="utf-8"?>
 <p:sld xmlns:a="http://schemas.openxmlformats.org/drawingml/2006/main" xmlns:r="http://schemas.openxmlformats.org/officeDocument/2006/relationships" xmlns:p="http://schemas.openxmlformats.org/presentationml/2006/main">
   <p:cSld>
     <p:spTree>
@@ -4105,7 +4449,7 @@
 </p:sld>
 </file>
 
-<file path=ppt/slides/slide12.xml><?xml version="1.0" encoding="utf-8"?>
+<file path=ppt/slides/slide13.xml><?xml version="1.0" encoding="utf-8"?>
 <p:sld xmlns:a="http://schemas.openxmlformats.org/drawingml/2006/main" xmlns:r="http://schemas.openxmlformats.org/officeDocument/2006/relationships" xmlns:p="http://schemas.openxmlformats.org/presentationml/2006/main">
   <p:cSld>
     <p:spTree>
@@ -4302,7 +4646,7 @@
 </p:sld>
 </file>
 
-<file path=ppt/slides/slide13.xml><?xml version="1.0" encoding="utf-8"?>
+<file path=ppt/slides/slide14.xml><?xml version="1.0" encoding="utf-8"?>
 <p:sld xmlns:a="http://schemas.openxmlformats.org/drawingml/2006/main" xmlns:r="http://schemas.openxmlformats.org/officeDocument/2006/relationships" xmlns:p="http://schemas.openxmlformats.org/presentationml/2006/main">
   <p:cSld>
     <p:spTree>
@@ -4558,7 +4902,7 @@
 </p:sld>
 </file>
 
-<file path=ppt/slides/slide14.xml><?xml version="1.0" encoding="utf-8"?>
+<file path=ppt/slides/slide15.xml><?xml version="1.0" encoding="utf-8"?>
 <p:sld xmlns:a="http://schemas.openxmlformats.org/drawingml/2006/main" xmlns:r="http://schemas.openxmlformats.org/officeDocument/2006/relationships" xmlns:p="http://schemas.openxmlformats.org/presentationml/2006/main">
   <p:cSld>
     <p:spTree>
@@ -5438,7 +5782,7 @@
 </p:sld>
 </file>
 
-<file path=ppt/slides/slide15.xml><?xml version="1.0" encoding="utf-8"?>
+<file path=ppt/slides/slide16.xml><?xml version="1.0" encoding="utf-8"?>
 <p:sld xmlns:a="http://schemas.openxmlformats.org/drawingml/2006/main" xmlns:r="http://schemas.openxmlformats.org/officeDocument/2006/relationships" xmlns:p="http://schemas.openxmlformats.org/presentationml/2006/main">
   <p:cSld>
     <p:spTree>
@@ -6374,7 +6718,7 @@
 </p:sld>
 </file>
 
-<file path=ppt/slides/slide16.xml><?xml version="1.0" encoding="utf-8"?>
+<file path=ppt/slides/slide17.xml><?xml version="1.0" encoding="utf-8"?>
 <p:sld xmlns:a="http://schemas.openxmlformats.org/drawingml/2006/main" xmlns:r="http://schemas.openxmlformats.org/officeDocument/2006/relationships" xmlns:p="http://schemas.openxmlformats.org/presentationml/2006/main">
   <p:cSld>
     <p:spTree>
@@ -6507,7 +6851,7 @@
 </p:sld>
 </file>
 
-<file path=ppt/slides/slide17.xml><?xml version="1.0" encoding="utf-8"?>
+<file path=ppt/slides/slide18.xml><?xml version="1.0" encoding="utf-8"?>
 <p:sld xmlns:a="http://schemas.openxmlformats.org/drawingml/2006/main" xmlns:r="http://schemas.openxmlformats.org/officeDocument/2006/relationships" xmlns:p="http://schemas.openxmlformats.org/presentationml/2006/main">
   <p:cSld>
     <p:spTree>
@@ -6638,6 +6982,189 @@
 </file>
 
 <file path=ppt/slides/slide2.xml><?xml version="1.0" encoding="utf-8"?>
+<p:sld xmlns:a="http://schemas.openxmlformats.org/drawingml/2006/main" xmlns:r="http://schemas.openxmlformats.org/officeDocument/2006/relationships" xmlns:p="http://schemas.openxmlformats.org/presentationml/2006/main">
+  <p:cSld>
+    <p:spTree>
+      <p:nvGrpSpPr>
+        <p:cNvPr id="1" name=""/>
+        <p:cNvGrpSpPr/>
+        <p:nvPr/>
+      </p:nvGrpSpPr>
+      <p:grpSpPr>
+        <a:xfrm>
+          <a:off x="0" y="0"/>
+          <a:ext cx="0" cy="0"/>
+          <a:chOff x="0" y="0"/>
+          <a:chExt cx="0" cy="0"/>
+        </a:xfrm>
+      </p:grpSpPr>
+      <p:grpSp>
+        <p:nvGrpSpPr>
+          <p:cNvPr id="18" name="Group 17">
+            <a:extLst>
+              <a:ext uri="{FF2B5EF4-FFF2-40B4-BE49-F238E27FC236}">
+                <a16:creationId xmlns:a16="http://schemas.microsoft.com/office/drawing/2014/main" id="{3FAEC16B-8B73-4042-8D37-82C9071457EC}"/>
+              </a:ext>
+            </a:extLst>
+          </p:cNvPr>
+          <p:cNvGrpSpPr/>
+          <p:nvPr/>
+        </p:nvGrpSpPr>
+        <p:grpSpPr>
+          <a:xfrm>
+            <a:off x="3357307" y="245287"/>
+            <a:ext cx="5492582" cy="5402324"/>
+            <a:chOff x="3357307" y="245287"/>
+            <a:chExt cx="5492582" cy="5402324"/>
+          </a:xfrm>
+        </p:grpSpPr>
+        <p:pic>
+          <p:nvPicPr>
+            <p:cNvPr id="9" name="Picture 8">
+              <a:extLst>
+                <a:ext uri="{FF2B5EF4-FFF2-40B4-BE49-F238E27FC236}">
+                  <a16:creationId xmlns:a16="http://schemas.microsoft.com/office/drawing/2014/main" id="{974816E0-9407-45E2-99D3-6228DDD5B0C5}"/>
+                </a:ext>
+              </a:extLst>
+            </p:cNvPr>
+            <p:cNvPicPr>
+              <a:picLocks noChangeAspect="1"/>
+            </p:cNvPicPr>
+            <p:nvPr/>
+          </p:nvPicPr>
+          <p:blipFill>
+            <a:blip r:embed="rId2">
+              <a:extLst>
+                <a:ext uri="{28A0092B-C50C-407E-A947-70E740481C1C}">
+                  <a14:useLocalDpi xmlns:a14="http://schemas.microsoft.com/office/drawing/2010/main" val="0"/>
+                </a:ext>
+              </a:extLst>
+            </a:blip>
+            <a:stretch>
+              <a:fillRect/>
+            </a:stretch>
+          </p:blipFill>
+          <p:spPr>
+            <a:xfrm>
+              <a:off x="6067425" y="373874"/>
+              <a:ext cx="2732613" cy="2250263"/>
+            </a:xfrm>
+            <a:prstGeom prst="rect">
+              <a:avLst/>
+            </a:prstGeom>
+          </p:spPr>
+        </p:pic>
+        <p:pic>
+          <p:nvPicPr>
+            <p:cNvPr id="13" name="Picture 12">
+              <a:extLst>
+                <a:ext uri="{FF2B5EF4-FFF2-40B4-BE49-F238E27FC236}">
+                  <a16:creationId xmlns:a16="http://schemas.microsoft.com/office/drawing/2014/main" id="{3054BCFD-5519-4692-A525-24C97AA346B3}"/>
+                </a:ext>
+              </a:extLst>
+            </p:cNvPr>
+            <p:cNvPicPr>
+              <a:picLocks noChangeAspect="1"/>
+            </p:cNvPicPr>
+            <p:nvPr/>
+          </p:nvPicPr>
+          <p:blipFill>
+            <a:blip r:embed="rId3">
+              <a:extLst>
+                <a:ext uri="{28A0092B-C50C-407E-A947-70E740481C1C}">
+                  <a14:useLocalDpi xmlns:a14="http://schemas.microsoft.com/office/drawing/2010/main" val="0"/>
+                </a:ext>
+              </a:extLst>
+            </a:blip>
+            <a:stretch>
+              <a:fillRect/>
+            </a:stretch>
+          </p:blipFill>
+          <p:spPr>
+            <a:xfrm>
+              <a:off x="3357307" y="245287"/>
+              <a:ext cx="2405512" cy="2412188"/>
+            </a:xfrm>
+            <a:prstGeom prst="rect">
+              <a:avLst/>
+            </a:prstGeom>
+          </p:spPr>
+        </p:pic>
+        <p:pic>
+          <p:nvPicPr>
+            <p:cNvPr id="17" name="Picture 16">
+              <a:extLst>
+                <a:ext uri="{FF2B5EF4-FFF2-40B4-BE49-F238E27FC236}">
+                  <a16:creationId xmlns:a16="http://schemas.microsoft.com/office/drawing/2014/main" id="{CA2F8DCE-FF3C-4B7B-A298-B1D12B7DB826}"/>
+                </a:ext>
+              </a:extLst>
+            </p:cNvPr>
+            <p:cNvPicPr>
+              <a:picLocks noChangeAspect="1"/>
+            </p:cNvPicPr>
+            <p:nvPr/>
+          </p:nvPicPr>
+          <p:blipFill>
+            <a:blip r:embed="rId4"/>
+            <a:stretch>
+              <a:fillRect/>
+            </a:stretch>
+          </p:blipFill>
+          <p:spPr>
+            <a:xfrm>
+              <a:off x="5028504" y="2753441"/>
+              <a:ext cx="3821385" cy="2894170"/>
+            </a:xfrm>
+            <a:prstGeom prst="rect">
+              <a:avLst/>
+            </a:prstGeom>
+          </p:spPr>
+        </p:pic>
+        <p:pic>
+          <p:nvPicPr>
+            <p:cNvPr id="16" name="Picture 15">
+              <a:extLst>
+                <a:ext uri="{FF2B5EF4-FFF2-40B4-BE49-F238E27FC236}">
+                  <a16:creationId xmlns:a16="http://schemas.microsoft.com/office/drawing/2014/main" id="{AD3DE7D0-DF9C-410E-A304-73C5707F569E}"/>
+                </a:ext>
+              </a:extLst>
+            </p:cNvPr>
+            <p:cNvPicPr>
+              <a:picLocks noChangeAspect="1"/>
+            </p:cNvPicPr>
+            <p:nvPr/>
+          </p:nvPicPr>
+          <p:blipFill>
+            <a:blip r:embed="rId5"/>
+            <a:stretch>
+              <a:fillRect/>
+            </a:stretch>
+          </p:blipFill>
+          <p:spPr>
+            <a:xfrm>
+              <a:off x="3659699" y="2755108"/>
+              <a:ext cx="1593106" cy="491490"/>
+            </a:xfrm>
+            <a:prstGeom prst="rect">
+              <a:avLst/>
+            </a:prstGeom>
+          </p:spPr>
+        </p:pic>
+      </p:grpSp>
+    </p:spTree>
+    <p:extLst>
+      <p:ext uri="{BB962C8B-B14F-4D97-AF65-F5344CB8AC3E}">
+        <p14:creationId xmlns:p14="http://schemas.microsoft.com/office/powerpoint/2010/main" val="1430436731"/>
+      </p:ext>
+    </p:extLst>
+  </p:cSld>
+  <p:clrMapOvr>
+    <a:masterClrMapping/>
+  </p:clrMapOvr>
+</p:sld>
+</file>
+
+<file path=ppt/slides/slide3.xml><?xml version="1.0" encoding="utf-8"?>
 <p:sld xmlns:a="http://schemas.openxmlformats.org/drawingml/2006/main" xmlns:r="http://schemas.openxmlformats.org/officeDocument/2006/relationships" xmlns:p="http://schemas.openxmlformats.org/presentationml/2006/main">
   <p:cSld>
     <p:spTree>
@@ -7927,7 +8454,7 @@
 </p:sld>
 </file>
 
-<file path=ppt/slides/slide3.xml><?xml version="1.0" encoding="utf-8"?>
+<file path=ppt/slides/slide4.xml><?xml version="1.0" encoding="utf-8"?>
 <p:sld xmlns:a="http://schemas.openxmlformats.org/drawingml/2006/main" xmlns:r="http://schemas.openxmlformats.org/officeDocument/2006/relationships" xmlns:p="http://schemas.openxmlformats.org/presentationml/2006/main">
   <p:cSld>
     <p:spTree>
@@ -9083,7 +9610,7 @@
 </p:sld>
 </file>
 
-<file path=ppt/slides/slide4.xml><?xml version="1.0" encoding="utf-8"?>
+<file path=ppt/slides/slide5.xml><?xml version="1.0" encoding="utf-8"?>
 <p:sld xmlns:a="http://schemas.openxmlformats.org/drawingml/2006/main" xmlns:r="http://schemas.openxmlformats.org/officeDocument/2006/relationships" xmlns:p="http://schemas.openxmlformats.org/presentationml/2006/main">
   <p:cSld>
     <p:spTree>
@@ -9475,7 +10002,7 @@
 </p:sld>
 </file>
 
-<file path=ppt/slides/slide5.xml><?xml version="1.0" encoding="utf-8"?>
+<file path=ppt/slides/slide6.xml><?xml version="1.0" encoding="utf-8"?>
 <p:sld xmlns:a="http://schemas.openxmlformats.org/drawingml/2006/main" xmlns:r="http://schemas.openxmlformats.org/officeDocument/2006/relationships" xmlns:p="http://schemas.openxmlformats.org/presentationml/2006/main">
   <p:cSld>
     <p:spTree>
@@ -10295,7 +10822,7 @@
 </p:sld>
 </file>
 
-<file path=ppt/slides/slide6.xml><?xml version="1.0" encoding="utf-8"?>
+<file path=ppt/slides/slide7.xml><?xml version="1.0" encoding="utf-8"?>
 <p:sld xmlns:a="http://schemas.openxmlformats.org/drawingml/2006/main" xmlns:r="http://schemas.openxmlformats.org/officeDocument/2006/relationships" xmlns:p="http://schemas.openxmlformats.org/presentationml/2006/main">
   <p:cSld>
     <p:spTree>
@@ -10571,7 +11098,7 @@
 </p:sld>
 </file>
 
-<file path=ppt/slides/slide7.xml><?xml version="1.0" encoding="utf-8"?>
+<file path=ppt/slides/slide8.xml><?xml version="1.0" encoding="utf-8"?>
 <p:sld xmlns:a="http://schemas.openxmlformats.org/drawingml/2006/main" xmlns:r="http://schemas.openxmlformats.org/officeDocument/2006/relationships" xmlns:p="http://schemas.openxmlformats.org/presentationml/2006/main">
   <p:cSld>
     <p:spTree>
@@ -10994,7 +11521,7 @@
 </p:sld>
 </file>
 
-<file path=ppt/slides/slide8.xml><?xml version="1.0" encoding="utf-8"?>
+<file path=ppt/slides/slide9.xml><?xml version="1.0" encoding="utf-8"?>
 <p:sld xmlns:a="http://schemas.openxmlformats.org/drawingml/2006/main" xmlns:r="http://schemas.openxmlformats.org/officeDocument/2006/relationships" xmlns:p="http://schemas.openxmlformats.org/presentationml/2006/main">
   <p:cSld>
     <p:spTree>
@@ -11512,349 +12039,6 @@
 </p:sld>
 </file>
 
-<file path=ppt/slides/slide9.xml><?xml version="1.0" encoding="utf-8"?>
-<p:sld xmlns:a="http://schemas.openxmlformats.org/drawingml/2006/main" xmlns:r="http://schemas.openxmlformats.org/officeDocument/2006/relationships" xmlns:p="http://schemas.openxmlformats.org/presentationml/2006/main">
-  <p:cSld>
-    <p:spTree>
-      <p:nvGrpSpPr>
-        <p:cNvPr id="1" name=""/>
-        <p:cNvGrpSpPr/>
-        <p:nvPr/>
-      </p:nvGrpSpPr>
-      <p:grpSpPr>
-        <a:xfrm>
-          <a:off x="0" y="0"/>
-          <a:ext cx="0" cy="0"/>
-          <a:chOff x="0" y="0"/>
-          <a:chExt cx="0" cy="0"/>
-        </a:xfrm>
-      </p:grpSpPr>
-      <p:sp>
-        <p:nvSpPr>
-          <p:cNvPr id="2" name="Title 1">
-            <a:extLst>
-              <a:ext uri="{FF2B5EF4-FFF2-40B4-BE49-F238E27FC236}">
-                <a16:creationId xmlns:a16="http://schemas.microsoft.com/office/drawing/2014/main" id="{FE839F3C-1493-4CF8-97F3-F2BED1A85040}"/>
-              </a:ext>
-            </a:extLst>
-          </p:cNvPr>
-          <p:cNvSpPr>
-            <a:spLocks noGrp="1"/>
-          </p:cNvSpPr>
-          <p:nvPr>
-            <p:ph type="title"/>
-          </p:nvPr>
-        </p:nvSpPr>
-        <p:spPr>
-          <a:xfrm>
-            <a:off x="838200" y="365125"/>
-            <a:ext cx="10515600" cy="1325563"/>
-          </a:xfrm>
-        </p:spPr>
-        <p:txBody>
-          <a:bodyPr/>
-          <a:lstStyle/>
-          <a:p>
-            <a:r>
-              <a:rPr lang="en-SG" dirty="0"/>
-              <a:t>Motivation for using </a:t>
-            </a:r>
-            <a:r>
-              <a:rPr lang="en-SG" dirty="0" err="1"/>
-              <a:t>Plotly</a:t>
-            </a:r>
-            <a:r>
-              <a:rPr lang="en-SG" dirty="0"/>
-              <a:t> and </a:t>
-            </a:r>
-            <a:r>
-              <a:rPr lang="en-SG" dirty="0" err="1"/>
-              <a:t>Trelliscopejs</a:t>
-            </a:r>
-            <a:r>
-              <a:rPr lang="en-SG" dirty="0"/>
-              <a:t> </a:t>
-            </a:r>
-          </a:p>
-        </p:txBody>
-      </p:sp>
-      <p:grpSp>
-        <p:nvGrpSpPr>
-          <p:cNvPr id="8" name="Group 7">
-            <a:extLst>
-              <a:ext uri="{FF2B5EF4-FFF2-40B4-BE49-F238E27FC236}">
-                <a16:creationId xmlns:a16="http://schemas.microsoft.com/office/drawing/2014/main" id="{8C04475F-A62A-4B8B-996C-BCBC9A8783DE}"/>
-              </a:ext>
-            </a:extLst>
-          </p:cNvPr>
-          <p:cNvGrpSpPr/>
-          <p:nvPr/>
-        </p:nvGrpSpPr>
-        <p:grpSpPr>
-          <a:xfrm>
-            <a:off x="6096000" y="1562378"/>
-            <a:ext cx="4771619" cy="4735268"/>
-            <a:chOff x="6096000" y="1562378"/>
-            <a:chExt cx="4771619" cy="4735268"/>
-          </a:xfrm>
-        </p:grpSpPr>
-        <p:pic>
-          <p:nvPicPr>
-            <p:cNvPr id="6" name="Picture 5">
-              <a:extLst>
-                <a:ext uri="{FF2B5EF4-FFF2-40B4-BE49-F238E27FC236}">
-                  <a16:creationId xmlns:a16="http://schemas.microsoft.com/office/drawing/2014/main" id="{C3A5A9DA-9F89-4395-8AC1-AA0889484D5E}"/>
-                </a:ext>
-              </a:extLst>
-            </p:cNvPr>
-            <p:cNvPicPr>
-              <a:picLocks noChangeAspect="1"/>
-            </p:cNvPicPr>
-            <p:nvPr/>
-          </p:nvPicPr>
-          <p:blipFill>
-            <a:blip r:embed="rId2"/>
-            <a:stretch>
-              <a:fillRect/>
-            </a:stretch>
-          </p:blipFill>
-          <p:spPr>
-            <a:xfrm>
-              <a:off x="6096000" y="3805032"/>
-              <a:ext cx="4771619" cy="1071659"/>
-            </a:xfrm>
-            <a:prstGeom prst="rect">
-              <a:avLst/>
-            </a:prstGeom>
-          </p:spPr>
-        </p:pic>
-        <p:pic>
-          <p:nvPicPr>
-            <p:cNvPr id="7" name="Picture 6">
-              <a:extLst>
-                <a:ext uri="{FF2B5EF4-FFF2-40B4-BE49-F238E27FC236}">
-                  <a16:creationId xmlns:a16="http://schemas.microsoft.com/office/drawing/2014/main" id="{1E7BA09E-3CAD-4812-865C-6CAC515BF3CE}"/>
-                </a:ext>
-              </a:extLst>
-            </p:cNvPr>
-            <p:cNvPicPr>
-              <a:picLocks noChangeAspect="1"/>
-            </p:cNvPicPr>
-            <p:nvPr/>
-          </p:nvPicPr>
-          <p:blipFill rotWithShape="1">
-            <a:blip r:embed="rId3"/>
-            <a:srcRect t="13773"/>
-            <a:stretch/>
-          </p:blipFill>
-          <p:spPr>
-            <a:xfrm>
-              <a:off x="6139296" y="6114177"/>
-              <a:ext cx="4728323" cy="183469"/>
-            </a:xfrm>
-            <a:prstGeom prst="rect">
-              <a:avLst/>
-            </a:prstGeom>
-          </p:spPr>
-        </p:pic>
-        <p:pic>
-          <p:nvPicPr>
-            <p:cNvPr id="1026" name="Picture 2" descr="https://hafen.github.io/trelliscopejs/reference/figures/logo.png">
-              <a:extLst>
-                <a:ext uri="{FF2B5EF4-FFF2-40B4-BE49-F238E27FC236}">
-                  <a16:creationId xmlns:a16="http://schemas.microsoft.com/office/drawing/2014/main" id="{FAB45369-F847-4D88-8638-67597D69B804}"/>
-                </a:ext>
-              </a:extLst>
-            </p:cNvPr>
-            <p:cNvPicPr>
-              <a:picLocks noChangeAspect="1" noChangeArrowheads="1"/>
-            </p:cNvPicPr>
-            <p:nvPr/>
-          </p:nvPicPr>
-          <p:blipFill>
-            <a:blip r:embed="rId4">
-              <a:extLst>
-                <a:ext uri="{28A0092B-C50C-407E-A947-70E740481C1C}">
-                  <a14:useLocalDpi xmlns:a14="http://schemas.microsoft.com/office/drawing/2010/main" val="0"/>
-                </a:ext>
-              </a:extLst>
-            </a:blip>
-            <a:srcRect/>
-            <a:stretch>
-              <a:fillRect/>
-            </a:stretch>
-          </p:blipFill>
-          <p:spPr bwMode="auto">
-            <a:xfrm>
-              <a:off x="9275906" y="1562378"/>
-              <a:ext cx="889687" cy="1034095"/>
-            </a:xfrm>
-            <a:prstGeom prst="rect">
-              <a:avLst/>
-            </a:prstGeom>
-            <a:noFill/>
-            <a:extLst>
-              <a:ext uri="{909E8E84-426E-40DD-AFC4-6F175D3DCCD1}">
-                <a14:hiddenFill xmlns:a14="http://schemas.microsoft.com/office/drawing/2010/main">
-                  <a:solidFill>
-                    <a:srgbClr val="FFFFFF"/>
-                  </a:solidFill>
-                </a14:hiddenFill>
-              </a:ext>
-            </a:extLst>
-          </p:spPr>
-        </p:pic>
-        <p:pic>
-          <p:nvPicPr>
-            <p:cNvPr id="1028" name="Picture 4" descr="File:Plotly logo for digital final (6).png">
-              <a:extLst>
-                <a:ext uri="{FF2B5EF4-FFF2-40B4-BE49-F238E27FC236}">
-                  <a16:creationId xmlns:a16="http://schemas.microsoft.com/office/drawing/2014/main" id="{DB95B450-861C-480E-B6CB-3F3DF3E7A71A}"/>
-                </a:ext>
-              </a:extLst>
-            </p:cNvPr>
-            <p:cNvPicPr>
-              <a:picLocks noChangeAspect="1" noChangeArrowheads="1"/>
-            </p:cNvPicPr>
-            <p:nvPr/>
-          </p:nvPicPr>
-          <p:blipFill rotWithShape="1">
-            <a:blip r:embed="rId5">
-              <a:extLst>
-                <a:ext uri="{28A0092B-C50C-407E-A947-70E740481C1C}">
-                  <a14:useLocalDpi xmlns:a14="http://schemas.microsoft.com/office/drawing/2010/main" val="0"/>
-                </a:ext>
-              </a:extLst>
-            </a:blip>
-            <a:srcRect l="5532" t="28940" r="5911" b="27095"/>
-            <a:stretch/>
-          </p:blipFill>
-          <p:spPr bwMode="auto">
-            <a:xfrm>
-              <a:off x="6390474" y="1562378"/>
-              <a:ext cx="2586914" cy="963233"/>
-            </a:xfrm>
-            <a:prstGeom prst="rect">
-              <a:avLst/>
-            </a:prstGeom>
-            <a:noFill/>
-            <a:extLst>
-              <a:ext uri="{909E8E84-426E-40DD-AFC4-6F175D3DCCD1}">
-                <a14:hiddenFill xmlns:a14="http://schemas.microsoft.com/office/drawing/2010/main">
-                  <a:solidFill>
-                    <a:srgbClr val="FFFFFF"/>
-                  </a:solidFill>
-                </a14:hiddenFill>
-              </a:ext>
-            </a:extLst>
-          </p:spPr>
-        </p:pic>
-        <p:sp>
-          <p:nvSpPr>
-            <p:cNvPr id="10" name="Arrow: Right 9">
-              <a:extLst>
-                <a:ext uri="{FF2B5EF4-FFF2-40B4-BE49-F238E27FC236}">
-                  <a16:creationId xmlns:a16="http://schemas.microsoft.com/office/drawing/2014/main" id="{3338BCA3-70EE-44CD-B10A-543B7D39CA40}"/>
-                </a:ext>
-              </a:extLst>
-            </p:cNvPr>
-            <p:cNvSpPr/>
-            <p:nvPr/>
-          </p:nvSpPr>
-          <p:spPr>
-            <a:xfrm rot="5400000">
-              <a:off x="8013050" y="5382155"/>
-              <a:ext cx="1015481" cy="194220"/>
-            </a:xfrm>
-            <a:prstGeom prst="rightArrow">
-              <a:avLst/>
-            </a:prstGeom>
-          </p:spPr>
-          <p:style>
-            <a:lnRef idx="2">
-              <a:schemeClr val="dk1">
-                <a:shade val="50000"/>
-              </a:schemeClr>
-            </a:lnRef>
-            <a:fillRef idx="1">
-              <a:schemeClr val="dk1"/>
-            </a:fillRef>
-            <a:effectRef idx="0">
-              <a:schemeClr val="dk1"/>
-            </a:effectRef>
-            <a:fontRef idx="minor">
-              <a:schemeClr val="lt1"/>
-            </a:fontRef>
-          </p:style>
-          <p:txBody>
-            <a:bodyPr rtlCol="0" anchor="ctr"/>
-            <a:lstStyle/>
-            <a:p>
-              <a:pPr algn="ctr"/>
-              <a:endParaRPr lang="en-SG"/>
-            </a:p>
-          </p:txBody>
-        </p:sp>
-        <p:sp>
-          <p:nvSpPr>
-            <p:cNvPr id="14" name="Arrow: Right 13">
-              <a:extLst>
-                <a:ext uri="{FF2B5EF4-FFF2-40B4-BE49-F238E27FC236}">
-                  <a16:creationId xmlns:a16="http://schemas.microsoft.com/office/drawing/2014/main" id="{34953C13-8F7D-4DD6-9741-0C188D22A33E}"/>
-                </a:ext>
-              </a:extLst>
-            </p:cNvPr>
-            <p:cNvSpPr/>
-            <p:nvPr/>
-          </p:nvSpPr>
-          <p:spPr>
-            <a:xfrm rot="5400000">
-              <a:off x="8003525" y="3044674"/>
-              <a:ext cx="1015481" cy="194220"/>
-            </a:xfrm>
-            <a:prstGeom prst="rightArrow">
-              <a:avLst/>
-            </a:prstGeom>
-          </p:spPr>
-          <p:style>
-            <a:lnRef idx="2">
-              <a:schemeClr val="dk1">
-                <a:shade val="50000"/>
-              </a:schemeClr>
-            </a:lnRef>
-            <a:fillRef idx="1">
-              <a:schemeClr val="dk1"/>
-            </a:fillRef>
-            <a:effectRef idx="0">
-              <a:schemeClr val="dk1"/>
-            </a:effectRef>
-            <a:fontRef idx="minor">
-              <a:schemeClr val="lt1"/>
-            </a:fontRef>
-          </p:style>
-          <p:txBody>
-            <a:bodyPr rtlCol="0" anchor="ctr"/>
-            <a:lstStyle/>
-            <a:p>
-              <a:pPr algn="ctr"/>
-              <a:endParaRPr lang="en-SG"/>
-            </a:p>
-          </p:txBody>
-        </p:sp>
-      </p:grpSp>
-    </p:spTree>
-    <p:extLst>
-      <p:ext uri="{BB962C8B-B14F-4D97-AF65-F5344CB8AC3E}">
-        <p14:creationId xmlns:p14="http://schemas.microsoft.com/office/powerpoint/2010/main" val="1553705019"/>
-      </p:ext>
-    </p:extLst>
-  </p:cSld>
-  <p:clrMapOvr>
-    <a:masterClrMapping/>
-  </p:clrMapOvr>
-</p:sld>
-</file>
-
 <file path=ppt/theme/theme1.xml><?xml version="1.0" encoding="utf-8"?>
 <a:theme xmlns:a="http://schemas.openxmlformats.org/drawingml/2006/main" name="Office Theme">
   <a:themeElements>

</xml_diff>

<commit_message>
Update introduction to lipids slides.
</commit_message>
<xml_diff>
--- a/images/Image_In_ppt.pptx
+++ b/images/Image_In_ppt.pptx
@@ -278,7 +278,7 @@
           <a:p>
             <a:fld id="{6AD9268C-4043-4F47-9E5A-AF01BC7E8A5E}" type="datetimeFigureOut">
               <a:rPr lang="en-SG" smtClean="0"/>
-              <a:t>6/8/2022</a:t>
+              <a:t>8/8/2022</a:t>
             </a:fld>
             <a:endParaRPr lang="en-SG"/>
           </a:p>
@@ -478,7 +478,7 @@
           <a:p>
             <a:fld id="{6AD9268C-4043-4F47-9E5A-AF01BC7E8A5E}" type="datetimeFigureOut">
               <a:rPr lang="en-SG" smtClean="0"/>
-              <a:t>6/8/2022</a:t>
+              <a:t>8/8/2022</a:t>
             </a:fld>
             <a:endParaRPr lang="en-SG"/>
           </a:p>
@@ -688,7 +688,7 @@
           <a:p>
             <a:fld id="{6AD9268C-4043-4F47-9E5A-AF01BC7E8A5E}" type="datetimeFigureOut">
               <a:rPr lang="en-SG" smtClean="0"/>
-              <a:t>6/8/2022</a:t>
+              <a:t>8/8/2022</a:t>
             </a:fld>
             <a:endParaRPr lang="en-SG"/>
           </a:p>
@@ -888,7 +888,7 @@
           <a:p>
             <a:fld id="{6AD9268C-4043-4F47-9E5A-AF01BC7E8A5E}" type="datetimeFigureOut">
               <a:rPr lang="en-SG" smtClean="0"/>
-              <a:t>6/8/2022</a:t>
+              <a:t>8/8/2022</a:t>
             </a:fld>
             <a:endParaRPr lang="en-SG"/>
           </a:p>
@@ -1164,7 +1164,7 @@
           <a:p>
             <a:fld id="{6AD9268C-4043-4F47-9E5A-AF01BC7E8A5E}" type="datetimeFigureOut">
               <a:rPr lang="en-SG" smtClean="0"/>
-              <a:t>6/8/2022</a:t>
+              <a:t>8/8/2022</a:t>
             </a:fld>
             <a:endParaRPr lang="en-SG"/>
           </a:p>
@@ -1432,7 +1432,7 @@
           <a:p>
             <a:fld id="{6AD9268C-4043-4F47-9E5A-AF01BC7E8A5E}" type="datetimeFigureOut">
               <a:rPr lang="en-SG" smtClean="0"/>
-              <a:t>6/8/2022</a:t>
+              <a:t>8/8/2022</a:t>
             </a:fld>
             <a:endParaRPr lang="en-SG"/>
           </a:p>
@@ -1847,7 +1847,7 @@
           <a:p>
             <a:fld id="{6AD9268C-4043-4F47-9E5A-AF01BC7E8A5E}" type="datetimeFigureOut">
               <a:rPr lang="en-SG" smtClean="0"/>
-              <a:t>6/8/2022</a:t>
+              <a:t>8/8/2022</a:t>
             </a:fld>
             <a:endParaRPr lang="en-SG"/>
           </a:p>
@@ -1989,7 +1989,7 @@
           <a:p>
             <a:fld id="{6AD9268C-4043-4F47-9E5A-AF01BC7E8A5E}" type="datetimeFigureOut">
               <a:rPr lang="en-SG" smtClean="0"/>
-              <a:t>6/8/2022</a:t>
+              <a:t>8/8/2022</a:t>
             </a:fld>
             <a:endParaRPr lang="en-SG"/>
           </a:p>
@@ -2102,7 +2102,7 @@
           <a:p>
             <a:fld id="{6AD9268C-4043-4F47-9E5A-AF01BC7E8A5E}" type="datetimeFigureOut">
               <a:rPr lang="en-SG" smtClean="0"/>
-              <a:t>6/8/2022</a:t>
+              <a:t>8/8/2022</a:t>
             </a:fld>
             <a:endParaRPr lang="en-SG"/>
           </a:p>
@@ -2415,7 +2415,7 @@
           <a:p>
             <a:fld id="{6AD9268C-4043-4F47-9E5A-AF01BC7E8A5E}" type="datetimeFigureOut">
               <a:rPr lang="en-SG" smtClean="0"/>
-              <a:t>6/8/2022</a:t>
+              <a:t>8/8/2022</a:t>
             </a:fld>
             <a:endParaRPr lang="en-SG"/>
           </a:p>
@@ -2704,7 +2704,7 @@
           <a:p>
             <a:fld id="{6AD9268C-4043-4F47-9E5A-AF01BC7E8A5E}" type="datetimeFigureOut">
               <a:rPr lang="en-SG" smtClean="0"/>
-              <a:t>6/8/2022</a:t>
+              <a:t>8/8/2022</a:t>
             </a:fld>
             <a:endParaRPr lang="en-SG"/>
           </a:p>
@@ -2947,7 +2947,7 @@
           <a:p>
             <a:fld id="{6AD9268C-4043-4F47-9E5A-AF01BC7E8A5E}" type="datetimeFigureOut">
               <a:rPr lang="en-SG" smtClean="0"/>
-              <a:t>6/8/2022</a:t>
+              <a:t>8/8/2022</a:t>
             </a:fld>
             <a:endParaRPr lang="en-SG"/>
           </a:p>
@@ -7000,10 +7000,10 @@
       </p:grpSpPr>
       <p:grpSp>
         <p:nvGrpSpPr>
-          <p:cNvPr id="18" name="Group 17">
+          <p:cNvPr id="5" name="Group 4">
             <a:extLst>
               <a:ext uri="{FF2B5EF4-FFF2-40B4-BE49-F238E27FC236}">
-                <a16:creationId xmlns:a16="http://schemas.microsoft.com/office/drawing/2014/main" id="{3FAEC16B-8B73-4042-8D37-82C9071457EC}"/>
+                <a16:creationId xmlns:a16="http://schemas.microsoft.com/office/drawing/2014/main" id="{548FEDD3-4C89-4CDA-A783-BEA0EC445785}"/>
               </a:ext>
             </a:extLst>
           </p:cNvPr>
@@ -7012,10 +7012,10 @@
         </p:nvGrpSpPr>
         <p:grpSpPr>
           <a:xfrm>
-            <a:off x="3357307" y="245287"/>
-            <a:ext cx="5492582" cy="5402324"/>
-            <a:chOff x="3357307" y="245287"/>
-            <a:chExt cx="5492582" cy="5402324"/>
+            <a:off x="2472283" y="421497"/>
+            <a:ext cx="5364352" cy="5273738"/>
+            <a:chOff x="2472283" y="421497"/>
+            <a:chExt cx="5364352" cy="5273738"/>
           </a:xfrm>
         </p:grpSpPr>
         <p:pic>
@@ -7046,7 +7046,7 @@
           </p:blipFill>
           <p:spPr>
             <a:xfrm>
-              <a:off x="6067425" y="373874"/>
+              <a:off x="5054171" y="421498"/>
               <a:ext cx="2732613" cy="2250263"/>
             </a:xfrm>
             <a:prstGeom prst="rect">
@@ -7082,8 +7082,8 @@
           </p:blipFill>
           <p:spPr>
             <a:xfrm>
-              <a:off x="3357307" y="245287"/>
-              <a:ext cx="2405512" cy="2412188"/>
+              <a:off x="2472283" y="421497"/>
+              <a:ext cx="2277281" cy="2283601"/>
             </a:xfrm>
             <a:prstGeom prst="rect">
               <a:avLst/>
@@ -7112,7 +7112,7 @@
           </p:blipFill>
           <p:spPr>
             <a:xfrm>
-              <a:off x="5028504" y="2753441"/>
+              <a:off x="4015250" y="2801065"/>
               <a:ext cx="3821385" cy="2894170"/>
             </a:xfrm>
             <a:prstGeom prst="rect">
@@ -7142,7 +7142,7 @@
           </p:blipFill>
           <p:spPr>
             <a:xfrm>
-              <a:off x="3659699" y="2755108"/>
+              <a:off x="2808370" y="4193382"/>
               <a:ext cx="1593106" cy="491490"/>
             </a:xfrm>
             <a:prstGeom prst="rect">

</xml_diff>

<commit_message>
Update the exported file locations.
</commit_message>
<xml_diff>
--- a/images/Image_In_ppt.pptx
+++ b/images/Image_In_ppt.pptx
@@ -21,7 +21,7 @@
     <p:sldId id="268" r:id="rId15"/>
     <p:sldId id="271" r:id="rId16"/>
     <p:sldId id="272" r:id="rId17"/>
-    <p:sldId id="273" r:id="rId18"/>
+    <p:sldId id="276" r:id="rId18"/>
     <p:sldId id="259" r:id="rId19"/>
   </p:sldIdLst>
   <p:sldSz cx="12192000" cy="6858000"/>
@@ -278,7 +278,7 @@
           <a:p>
             <a:fld id="{6AD9268C-4043-4F47-9E5A-AF01BC7E8A5E}" type="datetimeFigureOut">
               <a:rPr lang="en-SG" smtClean="0"/>
-              <a:t>8/8/2022</a:t>
+              <a:t>10/8/2022</a:t>
             </a:fld>
             <a:endParaRPr lang="en-SG"/>
           </a:p>
@@ -478,7 +478,7 @@
           <a:p>
             <a:fld id="{6AD9268C-4043-4F47-9E5A-AF01BC7E8A5E}" type="datetimeFigureOut">
               <a:rPr lang="en-SG" smtClean="0"/>
-              <a:t>8/8/2022</a:t>
+              <a:t>10/8/2022</a:t>
             </a:fld>
             <a:endParaRPr lang="en-SG"/>
           </a:p>
@@ -688,7 +688,7 @@
           <a:p>
             <a:fld id="{6AD9268C-4043-4F47-9E5A-AF01BC7E8A5E}" type="datetimeFigureOut">
               <a:rPr lang="en-SG" smtClean="0"/>
-              <a:t>8/8/2022</a:t>
+              <a:t>10/8/2022</a:t>
             </a:fld>
             <a:endParaRPr lang="en-SG"/>
           </a:p>
@@ -888,7 +888,7 @@
           <a:p>
             <a:fld id="{6AD9268C-4043-4F47-9E5A-AF01BC7E8A5E}" type="datetimeFigureOut">
               <a:rPr lang="en-SG" smtClean="0"/>
-              <a:t>8/8/2022</a:t>
+              <a:t>10/8/2022</a:t>
             </a:fld>
             <a:endParaRPr lang="en-SG"/>
           </a:p>
@@ -1164,7 +1164,7 @@
           <a:p>
             <a:fld id="{6AD9268C-4043-4F47-9E5A-AF01BC7E8A5E}" type="datetimeFigureOut">
               <a:rPr lang="en-SG" smtClean="0"/>
-              <a:t>8/8/2022</a:t>
+              <a:t>10/8/2022</a:t>
             </a:fld>
             <a:endParaRPr lang="en-SG"/>
           </a:p>
@@ -1432,7 +1432,7 @@
           <a:p>
             <a:fld id="{6AD9268C-4043-4F47-9E5A-AF01BC7E8A5E}" type="datetimeFigureOut">
               <a:rPr lang="en-SG" smtClean="0"/>
-              <a:t>8/8/2022</a:t>
+              <a:t>10/8/2022</a:t>
             </a:fld>
             <a:endParaRPr lang="en-SG"/>
           </a:p>
@@ -1847,7 +1847,7 @@
           <a:p>
             <a:fld id="{6AD9268C-4043-4F47-9E5A-AF01BC7E8A5E}" type="datetimeFigureOut">
               <a:rPr lang="en-SG" smtClean="0"/>
-              <a:t>8/8/2022</a:t>
+              <a:t>10/8/2022</a:t>
             </a:fld>
             <a:endParaRPr lang="en-SG"/>
           </a:p>
@@ -1989,7 +1989,7 @@
           <a:p>
             <a:fld id="{6AD9268C-4043-4F47-9E5A-AF01BC7E8A5E}" type="datetimeFigureOut">
               <a:rPr lang="en-SG" smtClean="0"/>
-              <a:t>8/8/2022</a:t>
+              <a:t>10/8/2022</a:t>
             </a:fld>
             <a:endParaRPr lang="en-SG"/>
           </a:p>
@@ -2102,7 +2102,7 @@
           <a:p>
             <a:fld id="{6AD9268C-4043-4F47-9E5A-AF01BC7E8A5E}" type="datetimeFigureOut">
               <a:rPr lang="en-SG" smtClean="0"/>
-              <a:t>8/8/2022</a:t>
+              <a:t>10/8/2022</a:t>
             </a:fld>
             <a:endParaRPr lang="en-SG"/>
           </a:p>
@@ -2415,7 +2415,7 @@
           <a:p>
             <a:fld id="{6AD9268C-4043-4F47-9E5A-AF01BC7E8A5E}" type="datetimeFigureOut">
               <a:rPr lang="en-SG" smtClean="0"/>
-              <a:t>8/8/2022</a:t>
+              <a:t>10/8/2022</a:t>
             </a:fld>
             <a:endParaRPr lang="en-SG"/>
           </a:p>
@@ -2704,7 +2704,7 @@
           <a:p>
             <a:fld id="{6AD9268C-4043-4F47-9E5A-AF01BC7E8A5E}" type="datetimeFigureOut">
               <a:rPr lang="en-SG" smtClean="0"/>
-              <a:t>8/8/2022</a:t>
+              <a:t>10/8/2022</a:t>
             </a:fld>
             <a:endParaRPr lang="en-SG"/>
           </a:p>
@@ -2947,7 +2947,7 @@
           <a:p>
             <a:fld id="{6AD9268C-4043-4F47-9E5A-AF01BC7E8A5E}" type="datetimeFigureOut">
               <a:rPr lang="en-SG" smtClean="0"/>
-              <a:t>8/8/2022</a:t>
+              <a:t>10/8/2022</a:t>
             </a:fld>
             <a:endParaRPr lang="en-SG"/>
           </a:p>
@@ -6737,10 +6737,10 @@
       </p:grpSpPr>
       <p:grpSp>
         <p:nvGrpSpPr>
-          <p:cNvPr id="6" name="Group 5">
+          <p:cNvPr id="14" name="Group 13">
             <a:extLst>
               <a:ext uri="{FF2B5EF4-FFF2-40B4-BE49-F238E27FC236}">
-                <a16:creationId xmlns:a16="http://schemas.microsoft.com/office/drawing/2014/main" id="{832B82DE-ABB8-4AAF-85AA-48AC2245F868}"/>
+                <a16:creationId xmlns:a16="http://schemas.microsoft.com/office/drawing/2014/main" id="{BB0DBDA9-5DD2-481A-BF8A-E9F9E706E997}"/>
               </a:ext>
             </a:extLst>
           </p:cNvPr>
@@ -6749,18 +6749,121 @@
         </p:nvGrpSpPr>
         <p:grpSpPr>
           <a:xfrm>
-            <a:off x="354330" y="1444237"/>
-            <a:ext cx="11189970" cy="4650377"/>
-            <a:chOff x="354330" y="1444237"/>
-            <a:chExt cx="11189970" cy="4650377"/>
+            <a:off x="664660" y="76201"/>
+            <a:ext cx="11205580" cy="3468616"/>
+            <a:chOff x="664660" y="76201"/>
+            <a:chExt cx="11205580" cy="3468616"/>
           </a:xfrm>
         </p:grpSpPr>
+        <p:grpSp>
+          <p:nvGrpSpPr>
+            <p:cNvPr id="8" name="Group 7">
+              <a:extLst>
+                <a:ext uri="{FF2B5EF4-FFF2-40B4-BE49-F238E27FC236}">
+                  <a16:creationId xmlns:a16="http://schemas.microsoft.com/office/drawing/2014/main" id="{A4667C32-D65B-47BD-9DFE-6B399ECEBB12}"/>
+                </a:ext>
+              </a:extLst>
+            </p:cNvPr>
+            <p:cNvGrpSpPr/>
+            <p:nvPr/>
+          </p:nvGrpSpPr>
+          <p:grpSpPr>
+            <a:xfrm>
+              <a:off x="664660" y="76202"/>
+              <a:ext cx="6431465" cy="3468615"/>
+              <a:chOff x="321760" y="198509"/>
+              <a:chExt cx="8593859" cy="4354441"/>
+            </a:xfrm>
+          </p:grpSpPr>
+          <p:pic>
+            <p:nvPicPr>
+              <p:cNvPr id="6" name="Picture 5">
+                <a:extLst>
+                  <a:ext uri="{FF2B5EF4-FFF2-40B4-BE49-F238E27FC236}">
+                    <a16:creationId xmlns:a16="http://schemas.microsoft.com/office/drawing/2014/main" id="{9E603D1F-F65F-4E75-A7BB-2823F4FFDC3A}"/>
+                  </a:ext>
+                </a:extLst>
+              </p:cNvPr>
+              <p:cNvPicPr>
+                <a:picLocks noChangeAspect="1"/>
+              </p:cNvPicPr>
+              <p:nvPr/>
+            </p:nvPicPr>
+            <p:blipFill>
+              <a:blip r:embed="rId2"/>
+              <a:stretch>
+                <a:fillRect/>
+              </a:stretch>
+            </p:blipFill>
+            <p:spPr>
+              <a:xfrm>
+                <a:off x="321760" y="198509"/>
+                <a:ext cx="8593859" cy="4354441"/>
+              </a:xfrm>
+              <a:prstGeom prst="rect">
+                <a:avLst/>
+              </a:prstGeom>
+            </p:spPr>
+          </p:pic>
+          <p:sp>
+            <p:nvSpPr>
+              <p:cNvPr id="7" name="Rectangle 6">
+                <a:extLst>
+                  <a:ext uri="{FF2B5EF4-FFF2-40B4-BE49-F238E27FC236}">
+                    <a16:creationId xmlns:a16="http://schemas.microsoft.com/office/drawing/2014/main" id="{34489814-EA09-4F08-84AA-CF7D6C8AD547}"/>
+                  </a:ext>
+                </a:extLst>
+              </p:cNvPr>
+              <p:cNvSpPr/>
+              <p:nvPr/>
+            </p:nvSpPr>
+            <p:spPr>
+              <a:xfrm>
+                <a:off x="6177812" y="3667125"/>
+                <a:ext cx="1556488" cy="790575"/>
+              </a:xfrm>
+              <a:prstGeom prst="rect">
+                <a:avLst/>
+              </a:prstGeom>
+              <a:noFill/>
+              <a:ln w="19050">
+                <a:solidFill>
+                  <a:srgbClr val="FF0000"/>
+                </a:solidFill>
+              </a:ln>
+            </p:spPr>
+            <p:style>
+              <a:lnRef idx="2">
+                <a:schemeClr val="accent1">
+                  <a:shade val="50000"/>
+                </a:schemeClr>
+              </a:lnRef>
+              <a:fillRef idx="1">
+                <a:schemeClr val="accent1"/>
+              </a:fillRef>
+              <a:effectRef idx="0">
+                <a:schemeClr val="accent1"/>
+              </a:effectRef>
+              <a:fontRef idx="minor">
+                <a:schemeClr val="lt1"/>
+              </a:fontRef>
+            </p:style>
+            <p:txBody>
+              <a:bodyPr rtlCol="0" anchor="ctr"/>
+              <a:lstStyle/>
+              <a:p>
+                <a:pPr algn="ctr"/>
+                <a:endParaRPr lang="en-SG"/>
+              </a:p>
+            </p:txBody>
+          </p:sp>
+        </p:grpSp>
         <p:pic>
           <p:nvPicPr>
-            <p:cNvPr id="4" name="Picture 3">
+            <p:cNvPr id="9" name="Picture 8">
               <a:extLst>
                 <a:ext uri="{FF2B5EF4-FFF2-40B4-BE49-F238E27FC236}">
-                  <a16:creationId xmlns:a16="http://schemas.microsoft.com/office/drawing/2014/main" id="{3490F29F-E551-4E7B-9326-87EDD4162D22}"/>
+                  <a16:creationId xmlns:a16="http://schemas.microsoft.com/office/drawing/2014/main" id="{0756460F-4A10-498F-9212-834EB20788C0}"/>
                 </a:ext>
               </a:extLst>
             </p:cNvPr>
@@ -6770,15 +6873,15 @@
             <p:nvPr/>
           </p:nvPicPr>
           <p:blipFill>
-            <a:blip r:embed="rId2"/>
+            <a:blip r:embed="rId3"/>
             <a:stretch>
               <a:fillRect/>
             </a:stretch>
           </p:blipFill>
           <p:spPr>
             <a:xfrm>
-              <a:off x="354330" y="1444237"/>
-              <a:ext cx="11189970" cy="4650377"/>
+              <a:off x="7222859" y="76201"/>
+              <a:ext cx="4647381" cy="3468616"/>
             </a:xfrm>
             <a:prstGeom prst="rect">
               <a:avLst/>
@@ -6787,10 +6890,10 @@
         </p:pic>
         <p:sp>
           <p:nvSpPr>
-            <p:cNvPr id="5" name="Rectangle 4">
+            <p:cNvPr id="10" name="Rectangle 9">
               <a:extLst>
                 <a:ext uri="{FF2B5EF4-FFF2-40B4-BE49-F238E27FC236}">
-                  <a16:creationId xmlns:a16="http://schemas.microsoft.com/office/drawing/2014/main" id="{4F681E00-6666-4607-B463-607229A8FB04}"/>
+                  <a16:creationId xmlns:a16="http://schemas.microsoft.com/office/drawing/2014/main" id="{CC012DB3-8715-4F7D-9593-0CDF01CDB1E6}"/>
                 </a:ext>
               </a:extLst>
             </p:cNvPr>
@@ -6799,14 +6902,14 @@
           </p:nvSpPr>
           <p:spPr>
             <a:xfrm>
-              <a:off x="1737360" y="5337810"/>
-              <a:ext cx="1931670" cy="756804"/>
+              <a:off x="7371307" y="2019300"/>
+              <a:ext cx="1534568" cy="742949"/>
             </a:xfrm>
             <a:prstGeom prst="rect">
               <a:avLst/>
             </a:prstGeom>
             <a:noFill/>
-            <a:ln>
+            <a:ln w="19050">
               <a:solidFill>
                 <a:srgbClr val="FF0000"/>
               </a:solidFill>
@@ -6837,11 +6940,59 @@
             </a:p>
           </p:txBody>
         </p:sp>
+        <p:cxnSp>
+          <p:nvCxnSpPr>
+            <p:cNvPr id="11" name="Connector: Elbow 10">
+              <a:extLst>
+                <a:ext uri="{FF2B5EF4-FFF2-40B4-BE49-F238E27FC236}">
+                  <a16:creationId xmlns:a16="http://schemas.microsoft.com/office/drawing/2014/main" id="{E72E2E9D-DDF4-4A89-B7CB-F0277B12B403}"/>
+                </a:ext>
+              </a:extLst>
+            </p:cNvPr>
+            <p:cNvCxnSpPr>
+              <a:cxnSpLocks/>
+              <a:stCxn id="7" idx="3"/>
+              <a:endCxn id="10" idx="1"/>
+            </p:cNvCxnSpPr>
+            <p:nvPr/>
+          </p:nvCxnSpPr>
+          <p:spPr>
+            <a:xfrm flipV="1">
+              <a:off x="6212050" y="2390775"/>
+              <a:ext cx="1159257" cy="763295"/>
+            </a:xfrm>
+            <a:prstGeom prst="bentConnector3">
+              <a:avLst>
+                <a:gd name="adj1" fmla="val 50000"/>
+              </a:avLst>
+            </a:prstGeom>
+            <a:ln w="19050">
+              <a:solidFill>
+                <a:srgbClr val="FF0000"/>
+              </a:solidFill>
+              <a:tailEnd type="triangle"/>
+            </a:ln>
+          </p:spPr>
+          <p:style>
+            <a:lnRef idx="1">
+              <a:schemeClr val="accent1"/>
+            </a:lnRef>
+            <a:fillRef idx="0">
+              <a:schemeClr val="accent1"/>
+            </a:fillRef>
+            <a:effectRef idx="0">
+              <a:schemeClr val="accent1"/>
+            </a:effectRef>
+            <a:fontRef idx="minor">
+              <a:schemeClr val="tx1"/>
+            </a:fontRef>
+          </p:style>
+        </p:cxnSp>
       </p:grpSp>
     </p:spTree>
     <p:extLst>
       <p:ext uri="{BB962C8B-B14F-4D97-AF65-F5344CB8AC3E}">
-        <p14:creationId xmlns:p14="http://schemas.microsoft.com/office/powerpoint/2010/main" val="1896799717"/>
+        <p14:creationId xmlns:p14="http://schemas.microsoft.com/office/powerpoint/2010/main" val="516717753"/>
       </p:ext>
     </p:extLst>
   </p:cSld>

</xml_diff>